<commit_message>
Added Lecture 12 and samples + edited presentation of Lecture 11
</commit_message>
<xml_diff>
--- a/11-Data-Structures.pptx
+++ b/11-Data-Structures.pptx
@@ -218,7 +218,7 @@
           <a:p>
             <a:fld id="{1A052DDE-B79B-4585-97B6-DCDE6083B029}" type="datetimeFigureOut">
               <a:rPr lang="bg-BG" smtClean="0"/>
-              <a:t>29.5.2015 г.</a:t>
+              <a:t>11.8.2015 г.</a:t>
             </a:fld>
             <a:endParaRPr lang="bg-BG"/>
           </a:p>
@@ -667,7 +667,7 @@
           <a:p>
             <a:fld id="{3EA744D9-3FBE-48D8-BF2A-85DF203E4D20}" type="datetimeFigureOut">
               <a:rPr lang="bg-BG" smtClean="0"/>
-              <a:t>29.5.2015 г.</a:t>
+              <a:t>11.8.2015 г.</a:t>
             </a:fld>
             <a:endParaRPr lang="bg-BG"/>
           </a:p>
@@ -837,7 +837,7 @@
           <a:p>
             <a:fld id="{3EA744D9-3FBE-48D8-BF2A-85DF203E4D20}" type="datetimeFigureOut">
               <a:rPr lang="bg-BG" smtClean="0"/>
-              <a:t>29.5.2015 г.</a:t>
+              <a:t>11.8.2015 г.</a:t>
             </a:fld>
             <a:endParaRPr lang="bg-BG"/>
           </a:p>
@@ -1017,7 +1017,7 @@
           <a:p>
             <a:fld id="{3EA744D9-3FBE-48D8-BF2A-85DF203E4D20}" type="datetimeFigureOut">
               <a:rPr lang="bg-BG" smtClean="0"/>
-              <a:t>29.5.2015 г.</a:t>
+              <a:t>11.8.2015 г.</a:t>
             </a:fld>
             <a:endParaRPr lang="bg-BG"/>
           </a:p>
@@ -1187,7 +1187,7 @@
           <a:p>
             <a:fld id="{3EA744D9-3FBE-48D8-BF2A-85DF203E4D20}" type="datetimeFigureOut">
               <a:rPr lang="bg-BG" smtClean="0"/>
-              <a:t>29.5.2015 г.</a:t>
+              <a:t>11.8.2015 г.</a:t>
             </a:fld>
             <a:endParaRPr lang="bg-BG"/>
           </a:p>
@@ -1433,7 +1433,7 @@
           <a:p>
             <a:fld id="{3EA744D9-3FBE-48D8-BF2A-85DF203E4D20}" type="datetimeFigureOut">
               <a:rPr lang="bg-BG" smtClean="0"/>
-              <a:t>29.5.2015 г.</a:t>
+              <a:t>11.8.2015 г.</a:t>
             </a:fld>
             <a:endParaRPr lang="bg-BG"/>
           </a:p>
@@ -1721,7 +1721,7 @@
           <a:p>
             <a:fld id="{3EA744D9-3FBE-48D8-BF2A-85DF203E4D20}" type="datetimeFigureOut">
               <a:rPr lang="bg-BG" smtClean="0"/>
-              <a:t>29.5.2015 г.</a:t>
+              <a:t>11.8.2015 г.</a:t>
             </a:fld>
             <a:endParaRPr lang="bg-BG"/>
           </a:p>
@@ -2143,7 +2143,7 @@
           <a:p>
             <a:fld id="{3EA744D9-3FBE-48D8-BF2A-85DF203E4D20}" type="datetimeFigureOut">
               <a:rPr lang="bg-BG" smtClean="0"/>
-              <a:t>29.5.2015 г.</a:t>
+              <a:t>11.8.2015 г.</a:t>
             </a:fld>
             <a:endParaRPr lang="bg-BG"/>
           </a:p>
@@ -2261,7 +2261,7 @@
           <a:p>
             <a:fld id="{3EA744D9-3FBE-48D8-BF2A-85DF203E4D20}" type="datetimeFigureOut">
               <a:rPr lang="bg-BG" smtClean="0"/>
-              <a:t>29.5.2015 г.</a:t>
+              <a:t>11.8.2015 г.</a:t>
             </a:fld>
             <a:endParaRPr lang="bg-BG"/>
           </a:p>
@@ -2356,7 +2356,7 @@
           <a:p>
             <a:fld id="{3EA744D9-3FBE-48D8-BF2A-85DF203E4D20}" type="datetimeFigureOut">
               <a:rPr lang="bg-BG" smtClean="0"/>
-              <a:t>29.5.2015 г.</a:t>
+              <a:t>11.8.2015 г.</a:t>
             </a:fld>
             <a:endParaRPr lang="bg-BG"/>
           </a:p>
@@ -2633,7 +2633,7 @@
           <a:p>
             <a:fld id="{3EA744D9-3FBE-48D8-BF2A-85DF203E4D20}" type="datetimeFigureOut">
               <a:rPr lang="bg-BG" smtClean="0"/>
-              <a:t>29.5.2015 г.</a:t>
+              <a:t>11.8.2015 г.</a:t>
             </a:fld>
             <a:endParaRPr lang="bg-BG"/>
           </a:p>
@@ -2886,7 +2886,7 @@
           <a:p>
             <a:fld id="{3EA744D9-3FBE-48D8-BF2A-85DF203E4D20}" type="datetimeFigureOut">
               <a:rPr lang="bg-BG" smtClean="0"/>
-              <a:t>29.5.2015 г.</a:t>
+              <a:t>11.8.2015 г.</a:t>
             </a:fld>
             <a:endParaRPr lang="bg-BG"/>
           </a:p>
@@ -3108,7 +3108,7 @@
           <a:p>
             <a:fld id="{3EA744D9-3FBE-48D8-BF2A-85DF203E4D20}" type="datetimeFigureOut">
               <a:rPr lang="bg-BG" smtClean="0"/>
-              <a:t>29.5.2015 г.</a:t>
+              <a:t>11.8.2015 г.</a:t>
             </a:fld>
             <a:endParaRPr lang="bg-BG"/>
           </a:p>
@@ -6275,14 +6275,14 @@
               <a:t>: </a:t>
             </a:r>
             <a:r>
-              <a:rPr lang="ru-RU" sz="2400" dirty="0" smtClean="0">
-                <a:solidFill>
-                  <a:schemeClr val="bg1">
-                    <a:lumMod val="95000"/>
-                  </a:schemeClr>
-                </a:solidFill>
-              </a:rPr>
-              <a:t>АоВбиАчЖаДм</a:t>
+              <a:rPr lang="en-US" sz="2400" dirty="0" err="1" smtClean="0">
+                <a:solidFill>
+                  <a:schemeClr val="bg1">
+                    <a:lumMod val="95000"/>
+                  </a:schemeClr>
+                </a:solidFill>
+              </a:rPr>
+              <a:t>AoVbiAcJaDm</a:t>
             </a:r>
             <a:endParaRPr lang="ru-RU" sz="2400" dirty="0">
               <a:solidFill>

</xml_diff>